<commit_message>
Updated KS test results in PPT
</commit_message>
<xml_diff>
--- a/somani4_MP1.pptx
+++ b/somani4_MP1.pptx
@@ -3699,7 +3699,45 @@
                 </a:solidFill>
                 <a:cs typeface="Calibri"/>
               </a:rPr>
-              <a:t>The type of trigger for ‘highway’ was almost always manual, meaning the AV never felt the need to disengage on highways.</a:t>
+              <a:t>The type of trigger for ‘highway’ was almost always ‘manual’, </a:t>
+            </a:r>
+            <a:r>
+              <a:rPr lang="en-US" sz="1800" b="1" dirty="0" err="1">
+                <a:solidFill>
+                  <a:schemeClr val="accent1">
+                    <a:lumMod val="75000"/>
+                  </a:schemeClr>
+                </a:solidFill>
+                <a:cs typeface="Calibri"/>
+              </a:rPr>
+              <a:t>i.e</a:t>
+            </a:r>
+            <a:r>
+              <a:rPr lang="en-US" sz="1800" b="1" dirty="0">
+                <a:solidFill>
+                  <a:schemeClr val="accent1">
+                    <a:lumMod val="75000"/>
+                  </a:schemeClr>
+                </a:solidFill>
+                <a:cs typeface="Calibri"/>
+              </a:rPr>
+              <a:t> the AV never felt the need to disengage on highways.</a:t>
+            </a:r>
+          </a:p>
+          <a:p>
+            <a:pPr marL="342900" indent="-342900">
+              <a:buAutoNum type="arabicParenBoth"/>
+            </a:pPr>
+            <a:r>
+              <a:rPr lang="en-US" sz="1800" b="1" dirty="0">
+                <a:solidFill>
+                  <a:schemeClr val="accent1">
+                    <a:lumMod val="75000"/>
+                  </a:schemeClr>
+                </a:solidFill>
+                <a:cs typeface="Calibri"/>
+              </a:rPr>
+              <a:t>The reaction time data for both cloudy and clear conditions may be drawn from the same distribution (Exponentiated Weibull) (thus verifying KS Test)</a:t>
             </a:r>
           </a:p>
           <a:p>

</xml_diff>